<commit_message>
->aaai style all graph updated notation table expanded
</commit_message>
<xml_diff>
--- a/resources/mypaper.pptx
+++ b/resources/mypaper.pptx
@@ -15,8 +15,9 @@
     <p:sldId id="262" r:id="rId9"/>
     <p:sldId id="261" r:id="rId10"/>
     <p:sldId id="258" r:id="rId11"/>
-    <p:sldId id="257" r:id="rId12"/>
-    <p:sldId id="260" r:id="rId13"/>
+    <p:sldId id="268" r:id="rId12"/>
+    <p:sldId id="257" r:id="rId13"/>
+    <p:sldId id="260" r:id="rId14"/>
   </p:sldIdLst>
   <p:sldSz cx="12192000" cy="6858000"/>
   <p:notesSz cx="6858000" cy="9144000"/>
@@ -254,7 +255,7 @@
           <a:p>
             <a:fld id="{CF4993DB-1284-461A-A2D5-97453C944B44}" type="datetimeFigureOut">
               <a:rPr lang="zh-CN" altLang="en-US" smtClean="0"/>
-              <a:t>2015/9/10</a:t>
+              <a:t>2015/9/11</a:t>
             </a:fld>
             <a:endParaRPr lang="zh-CN" altLang="en-US"/>
           </a:p>
@@ -424,7 +425,7 @@
           <a:p>
             <a:fld id="{CF4993DB-1284-461A-A2D5-97453C944B44}" type="datetimeFigureOut">
               <a:rPr lang="zh-CN" altLang="en-US" smtClean="0"/>
-              <a:t>2015/9/10</a:t>
+              <a:t>2015/9/11</a:t>
             </a:fld>
             <a:endParaRPr lang="zh-CN" altLang="en-US"/>
           </a:p>
@@ -604,7 +605,7 @@
           <a:p>
             <a:fld id="{CF4993DB-1284-461A-A2D5-97453C944B44}" type="datetimeFigureOut">
               <a:rPr lang="zh-CN" altLang="en-US" smtClean="0"/>
-              <a:t>2015/9/10</a:t>
+              <a:t>2015/9/11</a:t>
             </a:fld>
             <a:endParaRPr lang="zh-CN" altLang="en-US"/>
           </a:p>
@@ -774,7 +775,7 @@
           <a:p>
             <a:fld id="{CF4993DB-1284-461A-A2D5-97453C944B44}" type="datetimeFigureOut">
               <a:rPr lang="zh-CN" altLang="en-US" smtClean="0"/>
-              <a:t>2015/9/10</a:t>
+              <a:t>2015/9/11</a:t>
             </a:fld>
             <a:endParaRPr lang="zh-CN" altLang="en-US"/>
           </a:p>
@@ -1020,7 +1021,7 @@
           <a:p>
             <a:fld id="{CF4993DB-1284-461A-A2D5-97453C944B44}" type="datetimeFigureOut">
               <a:rPr lang="zh-CN" altLang="en-US" smtClean="0"/>
-              <a:t>2015/9/10</a:t>
+              <a:t>2015/9/11</a:t>
             </a:fld>
             <a:endParaRPr lang="zh-CN" altLang="en-US"/>
           </a:p>
@@ -1252,7 +1253,7 @@
           <a:p>
             <a:fld id="{CF4993DB-1284-461A-A2D5-97453C944B44}" type="datetimeFigureOut">
               <a:rPr lang="zh-CN" altLang="en-US" smtClean="0"/>
-              <a:t>2015/9/10</a:t>
+              <a:t>2015/9/11</a:t>
             </a:fld>
             <a:endParaRPr lang="zh-CN" altLang="en-US"/>
           </a:p>
@@ -1619,7 +1620,7 @@
           <a:p>
             <a:fld id="{CF4993DB-1284-461A-A2D5-97453C944B44}" type="datetimeFigureOut">
               <a:rPr lang="zh-CN" altLang="en-US" smtClean="0"/>
-              <a:t>2015/9/10</a:t>
+              <a:t>2015/9/11</a:t>
             </a:fld>
             <a:endParaRPr lang="zh-CN" altLang="en-US"/>
           </a:p>
@@ -1737,7 +1738,7 @@
           <a:p>
             <a:fld id="{CF4993DB-1284-461A-A2D5-97453C944B44}" type="datetimeFigureOut">
               <a:rPr lang="zh-CN" altLang="en-US" smtClean="0"/>
-              <a:t>2015/9/10</a:t>
+              <a:t>2015/9/11</a:t>
             </a:fld>
             <a:endParaRPr lang="zh-CN" altLang="en-US"/>
           </a:p>
@@ -1832,7 +1833,7 @@
           <a:p>
             <a:fld id="{CF4993DB-1284-461A-A2D5-97453C944B44}" type="datetimeFigureOut">
               <a:rPr lang="zh-CN" altLang="en-US" smtClean="0"/>
-              <a:t>2015/9/10</a:t>
+              <a:t>2015/9/11</a:t>
             </a:fld>
             <a:endParaRPr lang="zh-CN" altLang="en-US"/>
           </a:p>
@@ -2109,7 +2110,7 @@
           <a:p>
             <a:fld id="{CF4993DB-1284-461A-A2D5-97453C944B44}" type="datetimeFigureOut">
               <a:rPr lang="zh-CN" altLang="en-US" smtClean="0"/>
-              <a:t>2015/9/10</a:t>
+              <a:t>2015/9/11</a:t>
             </a:fld>
             <a:endParaRPr lang="zh-CN" altLang="en-US"/>
           </a:p>
@@ -2362,7 +2363,7 @@
           <a:p>
             <a:fld id="{CF4993DB-1284-461A-A2D5-97453C944B44}" type="datetimeFigureOut">
               <a:rPr lang="zh-CN" altLang="en-US" smtClean="0"/>
-              <a:t>2015/9/10</a:t>
+              <a:t>2015/9/11</a:t>
             </a:fld>
             <a:endParaRPr lang="zh-CN" altLang="en-US"/>
           </a:p>
@@ -2575,7 +2576,7 @@
           <a:p>
             <a:fld id="{CF4993DB-1284-461A-A2D5-97453C944B44}" type="datetimeFigureOut">
               <a:rPr lang="zh-CN" altLang="en-US" smtClean="0"/>
-              <a:t>2015/9/10</a:t>
+              <a:t>2015/9/11</a:t>
             </a:fld>
             <a:endParaRPr lang="zh-CN" altLang="en-US"/>
           </a:p>
@@ -2995,7 +2996,7 @@
           <a:bodyPr/>
           <a:lstStyle/>
           <a:p>
-            <a:endParaRPr lang="zh-CN" altLang="en-US"/>
+            <a:endParaRPr lang="zh-CN" altLang="en-US" dirty="0"/>
           </a:p>
         </p:txBody>
       </p:sp>
@@ -3063,22 +3064,27 @@
         </p:nvSpPr>
         <p:spPr>
           <a:xfrm>
-            <a:off x="5289641" y="1661656"/>
-            <a:ext cx="1251890" cy="2981683"/>
+            <a:off x="5289641" y="1740973"/>
+            <a:ext cx="1251890" cy="2791912"/>
           </a:xfrm>
           <a:prstGeom prst="roundRect">
-            <a:avLst/>
+            <a:avLst>
+              <a:gd name="adj" fmla="val 5210"/>
+            </a:avLst>
           </a:prstGeom>
           <a:solidFill>
             <a:schemeClr val="bg1"/>
           </a:solidFill>
-          <a:ln>
+          <a:ln w="19050">
             <a:solidFill>
-              <a:schemeClr val="bg1">
+              <a:schemeClr val="tx1">
                 <a:lumMod val="50000"/>
+                <a:lumOff val="50000"/>
               </a:schemeClr>
             </a:solidFill>
+            <a:prstDash val="sysDash"/>
           </a:ln>
+          <a:effectLst/>
         </p:spPr>
         <p:style>
           <a:lnRef idx="0">
@@ -3104,7 +3110,7 @@
           <a:lstStyle/>
           <a:p>
             <a:pPr algn="ctr"/>
-            <a:endParaRPr lang="zh-CN" altLang="en-US" sz="2400" dirty="0" smtClean="0">
+            <a:endParaRPr lang="zh-CN" altLang="en-US" sz="2400" dirty="0">
               <a:solidFill>
                 <a:schemeClr val="tx1"/>
               </a:solidFill>
@@ -3120,8 +3126,8 @@
         </p:nvSpPr>
         <p:spPr>
           <a:xfrm>
-            <a:off x="1940275" y="1723763"/>
-            <a:ext cx="1231910" cy="2919575"/>
+            <a:off x="1966629" y="1713148"/>
+            <a:ext cx="1231910" cy="2902365"/>
           </a:xfrm>
           <a:prstGeom prst="ellipse">
             <a:avLst/>
@@ -3129,13 +3135,16 @@
           <a:solidFill>
             <a:schemeClr val="bg1"/>
           </a:solidFill>
-          <a:ln>
+          <a:ln w="19050">
             <a:solidFill>
-              <a:schemeClr val="bg1">
+              <a:schemeClr val="tx1">
                 <a:lumMod val="50000"/>
+                <a:lumOff val="50000"/>
               </a:schemeClr>
             </a:solidFill>
+            <a:prstDash val="sysDash"/>
           </a:ln>
+          <a:effectLst/>
         </p:spPr>
         <p:style>
           <a:lnRef idx="0">
@@ -3161,7 +3170,7 @@
           <a:lstStyle/>
           <a:p>
             <a:pPr algn="ctr"/>
-            <a:endParaRPr lang="zh-CN" altLang="en-US" sz="2000" dirty="0" smtClean="0">
+            <a:endParaRPr lang="zh-CN" altLang="en-US" sz="2400" dirty="0">
               <a:solidFill>
                 <a:schemeClr val="tx1"/>
               </a:solidFill>
@@ -3177,7 +3186,7 @@
         </p:nvSpPr>
         <p:spPr>
           <a:xfrm>
-            <a:off x="7079349" y="1740973"/>
+            <a:off x="7070659" y="1704852"/>
             <a:ext cx="1347185" cy="2902366"/>
           </a:xfrm>
           <a:prstGeom prst="ellipse">
@@ -3186,13 +3195,16 @@
           <a:solidFill>
             <a:schemeClr val="bg1"/>
           </a:solidFill>
-          <a:ln>
+          <a:ln w="19050">
             <a:solidFill>
-              <a:schemeClr val="bg1">
+              <a:schemeClr val="tx1">
                 <a:lumMod val="50000"/>
+                <a:lumOff val="50000"/>
               </a:schemeClr>
             </a:solidFill>
+            <a:prstDash val="sysDash"/>
           </a:ln>
+          <a:effectLst/>
         </p:spPr>
         <p:style>
           <a:lnRef idx="0">
@@ -3234,22 +3246,27 @@
         </p:nvSpPr>
         <p:spPr>
           <a:xfrm>
-            <a:off x="3675447" y="1661656"/>
-            <a:ext cx="1251890" cy="2981683"/>
+            <a:off x="3675447" y="1740973"/>
+            <a:ext cx="1251890" cy="2791912"/>
           </a:xfrm>
           <a:prstGeom prst="roundRect">
-            <a:avLst/>
+            <a:avLst>
+              <a:gd name="adj" fmla="val 5926"/>
+            </a:avLst>
           </a:prstGeom>
           <a:solidFill>
             <a:schemeClr val="bg1"/>
           </a:solidFill>
-          <a:ln>
+          <a:ln w="19050">
             <a:solidFill>
-              <a:schemeClr val="bg1">
+              <a:schemeClr val="tx1">
                 <a:lumMod val="50000"/>
+                <a:lumOff val="50000"/>
               </a:schemeClr>
             </a:solidFill>
+            <a:prstDash val="sysDash"/>
           </a:ln>
+          <a:effectLst/>
         </p:spPr>
         <p:style>
           <a:lnRef idx="0">
@@ -3275,7 +3292,7 @@
           <a:lstStyle/>
           <a:p>
             <a:pPr algn="ctr"/>
-            <a:endParaRPr lang="zh-CN" altLang="en-US" sz="2400" dirty="0" smtClean="0">
+            <a:endParaRPr lang="zh-CN" altLang="en-US" sz="2400" dirty="0">
               <a:solidFill>
                 <a:schemeClr val="tx1"/>
               </a:solidFill>
@@ -3301,11 +3318,7 @@
             <a:schemeClr val="bg1"/>
           </a:solidFill>
           <a:ln>
-            <a:solidFill>
-              <a:schemeClr val="bg1">
-                <a:lumMod val="50000"/>
-              </a:schemeClr>
-            </a:solidFill>
+            <a:noFill/>
           </a:ln>
         </p:spPr>
         <p:style>
@@ -3333,14 +3346,14 @@
           <a:p>
             <a:pPr algn="ctr"/>
             <a:r>
-              <a:rPr lang="en-US" altLang="zh-CN" sz="1400" dirty="0" smtClean="0">
+              <a:rPr lang="en-US" altLang="zh-CN" sz="1400" dirty="0">
                 <a:solidFill>
                   <a:schemeClr val="tx1"/>
                 </a:solidFill>
               </a:rPr>
               <a:t>MICROSOFT</a:t>
             </a:r>
-            <a:endParaRPr lang="zh-CN" altLang="en-US" sz="1400" dirty="0" smtClean="0">
+            <a:endParaRPr lang="zh-CN" altLang="en-US" sz="1400" dirty="0">
               <a:solidFill>
                 <a:schemeClr val="tx1"/>
               </a:solidFill>
@@ -3366,11 +3379,7 @@
             <a:schemeClr val="bg1"/>
           </a:solidFill>
           <a:ln>
-            <a:solidFill>
-              <a:schemeClr val="bg1">
-                <a:lumMod val="50000"/>
-              </a:schemeClr>
-            </a:solidFill>
+            <a:noFill/>
           </a:ln>
         </p:spPr>
         <p:style>
@@ -3431,11 +3440,7 @@
             <a:schemeClr val="bg1"/>
           </a:solidFill>
           <a:ln>
-            <a:solidFill>
-              <a:schemeClr val="bg1">
-                <a:lumMod val="50000"/>
-              </a:schemeClr>
-            </a:solidFill>
+            <a:noFill/>
           </a:ln>
         </p:spPr>
         <p:style>
@@ -3496,11 +3501,7 @@
             <a:schemeClr val="bg1"/>
           </a:solidFill>
           <a:ln>
-            <a:solidFill>
-              <a:schemeClr val="bg1">
-                <a:lumMod val="50000"/>
-              </a:schemeClr>
-            </a:solidFill>
+            <a:noFill/>
           </a:ln>
         </p:spPr>
         <p:style>
@@ -3561,11 +3562,7 @@
             <a:schemeClr val="bg1"/>
           </a:solidFill>
           <a:ln>
-            <a:solidFill>
-              <a:schemeClr val="bg1">
-                <a:lumMod val="50000"/>
-              </a:schemeClr>
-            </a:solidFill>
+            <a:noFill/>
           </a:ln>
         </p:spPr>
         <p:style>
@@ -3626,11 +3623,7 @@
             <a:schemeClr val="bg1"/>
           </a:solidFill>
           <a:ln>
-            <a:solidFill>
-              <a:schemeClr val="bg1">
-                <a:lumMod val="50000"/>
-              </a:schemeClr>
-            </a:solidFill>
+            <a:noFill/>
           </a:ln>
         </p:spPr>
         <p:style>
@@ -3732,9 +3725,6 @@
             <a:avLst/>
           </a:prstGeom>
           <a:ln w="28575">
-            <a:solidFill>
-              <a:srgbClr val="7030A0"/>
-            </a:solidFill>
             <a:miter lim="800000"/>
             <a:tailEnd type="triangle" w="sm" len="lg"/>
           </a:ln>
@@ -3890,11 +3880,7 @@
             <a:schemeClr val="bg1"/>
           </a:solidFill>
           <a:ln>
-            <a:solidFill>
-              <a:schemeClr val="bg1">
-                <a:lumMod val="50000"/>
-              </a:schemeClr>
-            </a:solidFill>
+            <a:noFill/>
           </a:ln>
         </p:spPr>
         <p:style>
@@ -4033,9 +4019,6 @@
             <a:avLst/>
           </a:prstGeom>
           <a:ln w="28575">
-            <a:solidFill>
-              <a:srgbClr val="7030A0"/>
-            </a:solidFill>
             <a:miter lim="800000"/>
             <a:tailEnd type="triangle" w="sm" len="lg"/>
           </a:ln>
@@ -4134,9 +4117,7 @@
           </a:solidFill>
           <a:ln>
             <a:solidFill>
-              <a:schemeClr val="bg1">
-                <a:lumMod val="50000"/>
-              </a:schemeClr>
+              <a:schemeClr val="bg1"/>
             </a:solidFill>
           </a:ln>
         </p:spPr>
@@ -4223,9 +4204,7 @@
           </a:solidFill>
           <a:ln>
             <a:solidFill>
-              <a:schemeClr val="bg1">
-                <a:lumMod val="50000"/>
-              </a:schemeClr>
+              <a:schemeClr val="bg1"/>
             </a:solidFill>
           </a:ln>
         </p:spPr>
@@ -4287,11 +4266,7 @@
             <a:schemeClr val="bg1"/>
           </a:solidFill>
           <a:ln>
-            <a:solidFill>
-              <a:schemeClr val="bg1">
-                <a:lumMod val="50000"/>
-              </a:schemeClr>
-            </a:solidFill>
+            <a:noFill/>
           </a:ln>
         </p:spPr>
         <p:style>
@@ -4352,11 +4327,7 @@
             <a:schemeClr val="bg1"/>
           </a:solidFill>
           <a:ln>
-            <a:solidFill>
-              <a:schemeClr val="bg1">
-                <a:lumMod val="50000"/>
-              </a:schemeClr>
-            </a:solidFill>
+            <a:noFill/>
           </a:ln>
         </p:spPr>
         <p:style>
@@ -4386,7 +4357,7 @@
             <a:r>
               <a:rPr lang="en-US" altLang="zh-CN" sz="1200" dirty="0">
                 <a:solidFill>
-                  <a:schemeClr val="tx1"/>
+                  <a:srgbClr val="7030A0"/>
                 </a:solidFill>
               </a:rPr>
               <a:t>Movie</a:t>
@@ -4412,11 +4383,7 @@
             <a:schemeClr val="bg1"/>
           </a:solidFill>
           <a:ln>
-            <a:solidFill>
-              <a:schemeClr val="bg1">
-                <a:lumMod val="50000"/>
-              </a:schemeClr>
-            </a:solidFill>
+            <a:noFill/>
           </a:ln>
         </p:spPr>
         <p:style>
@@ -4478,9 +4445,7 @@
           </a:solidFill>
           <a:ln>
             <a:solidFill>
-              <a:schemeClr val="bg1">
-                <a:lumMod val="50000"/>
-              </a:schemeClr>
+              <a:schemeClr val="bg1"/>
             </a:solidFill>
           </a:ln>
         </p:spPr>
@@ -4942,11 +4907,7 @@
             <a:schemeClr val="bg1"/>
           </a:solidFill>
           <a:ln>
-            <a:solidFill>
-              <a:schemeClr val="bg1">
-                <a:lumMod val="50000"/>
-              </a:schemeClr>
-            </a:solidFill>
+            <a:noFill/>
           </a:ln>
         </p:spPr>
         <p:style>
@@ -5071,6 +5032,9 @@
             <a:avLst/>
           </a:prstGeom>
           <a:noFill/>
+          <a:ln>
+            <a:noFill/>
+          </a:ln>
         </p:spPr>
         <p:txBody>
           <a:bodyPr wrap="square" rtlCol="0">
@@ -5131,6 +5095,9 @@
             <a:avLst/>
           </a:prstGeom>
           <a:noFill/>
+          <a:ln>
+            <a:noFill/>
+          </a:ln>
         </p:spPr>
         <p:txBody>
           <a:bodyPr wrap="square" rtlCol="0">
@@ -5158,13 +5125,16 @@
         </p:nvSpPr>
         <p:spPr>
           <a:xfrm>
-            <a:off x="2364376" y="1645091"/>
+            <a:off x="2242516" y="1727754"/>
             <a:ext cx="529947" cy="338554"/>
           </a:xfrm>
           <a:prstGeom prst="rect">
             <a:avLst/>
           </a:prstGeom>
           <a:noFill/>
+          <a:ln>
+            <a:noFill/>
+          </a:ln>
         </p:spPr>
         <p:txBody>
           <a:bodyPr wrap="square" rtlCol="0">
@@ -5233,6 +5203,9 @@
             <a:avLst/>
           </a:prstGeom>
           <a:noFill/>
+          <a:ln>
+            <a:noFill/>
+          </a:ln>
         </p:spPr>
         <p:txBody>
           <a:bodyPr wrap="square" rtlCol="0">
@@ -5273,6 +5246,1199 @@
 </file>
 
 <file path=ppt/slides/slide11.xml><?xml version="1.0" encoding="utf-8"?>
+<p:sld xmlns:a="http://schemas.openxmlformats.org/drawingml/2006/main" xmlns:r="http://schemas.openxmlformats.org/officeDocument/2006/relationships" xmlns:p="http://schemas.openxmlformats.org/presentationml/2006/main">
+  <p:cSld>
+    <p:spTree>
+      <p:nvGrpSpPr>
+        <p:cNvPr id="1" name=""/>
+        <p:cNvGrpSpPr/>
+        <p:nvPr/>
+      </p:nvGrpSpPr>
+      <p:grpSpPr>
+        <a:xfrm>
+          <a:off x="0" y="0"/>
+          <a:ext cx="0" cy="0"/>
+          <a:chOff x="0" y="0"/>
+          <a:chExt cx="0" cy="0"/>
+        </a:xfrm>
+      </p:grpSpPr>
+      <p:sp>
+        <p:nvSpPr>
+          <p:cNvPr id="4" name="圆角矩形 3"/>
+          <p:cNvSpPr/>
+          <p:nvPr/>
+        </p:nvSpPr>
+        <p:spPr>
+          <a:xfrm>
+            <a:off x="3237885" y="2191717"/>
+            <a:ext cx="1459621" cy="465323"/>
+          </a:xfrm>
+          <a:prstGeom prst="roundRect">
+            <a:avLst/>
+          </a:prstGeom>
+          <a:solidFill>
+            <a:schemeClr val="bg1"/>
+          </a:solidFill>
+          <a:ln>
+            <a:noFill/>
+          </a:ln>
+        </p:spPr>
+        <p:style>
+          <a:lnRef idx="0">
+            <a:schemeClr val="accent1"/>
+          </a:lnRef>
+          <a:fillRef idx="3">
+            <a:schemeClr val="accent1"/>
+          </a:fillRef>
+          <a:effectRef idx="3">
+            <a:schemeClr val="accent1"/>
+          </a:effectRef>
+          <a:fontRef idx="minor">
+            <a:schemeClr val="lt1"/>
+          </a:fontRef>
+        </p:style>
+        <p:txBody>
+          <a:bodyPr rot="0" spcFirstLastPara="0" vertOverflow="overflow" horzOverflow="overflow" vert="horz" wrap="square" lIns="91440" tIns="45720" rIns="91440" bIns="45720" numCol="1" spcCol="0" rtlCol="0" fromWordArt="0" anchor="ctr" anchorCtr="0" forceAA="0" compatLnSpc="1">
+            <a:prstTxWarp prst="textNoShape">
+              <a:avLst/>
+            </a:prstTxWarp>
+            <a:noAutofit/>
+          </a:bodyPr>
+          <a:lstStyle/>
+          <a:p>
+            <a:pPr algn="ctr"/>
+            <a:r>
+              <a:rPr lang="en-US" altLang="zh-CN" dirty="0">
+                <a:solidFill>
+                  <a:schemeClr val="tx1"/>
+                </a:solidFill>
+              </a:rPr>
+              <a:t>Leader</a:t>
+            </a:r>
+          </a:p>
+        </p:txBody>
+      </p:sp>
+      <p:sp>
+        <p:nvSpPr>
+          <p:cNvPr id="5" name="圆角矩形 4"/>
+          <p:cNvSpPr/>
+          <p:nvPr/>
+        </p:nvSpPr>
+        <p:spPr>
+          <a:xfrm>
+            <a:off x="3237885" y="5990088"/>
+            <a:ext cx="1852250" cy="506833"/>
+          </a:xfrm>
+          <a:prstGeom prst="roundRect">
+            <a:avLst/>
+          </a:prstGeom>
+          <a:solidFill>
+            <a:schemeClr val="bg1"/>
+          </a:solidFill>
+          <a:ln>
+            <a:noFill/>
+          </a:ln>
+        </p:spPr>
+        <p:style>
+          <a:lnRef idx="0">
+            <a:schemeClr val="accent1"/>
+          </a:lnRef>
+          <a:fillRef idx="3">
+            <a:schemeClr val="accent1"/>
+          </a:fillRef>
+          <a:effectRef idx="3">
+            <a:schemeClr val="accent1"/>
+          </a:effectRef>
+          <a:fontRef idx="minor">
+            <a:schemeClr val="lt1"/>
+          </a:fontRef>
+        </p:style>
+        <p:txBody>
+          <a:bodyPr rot="0" spcFirstLastPara="0" vertOverflow="overflow" horzOverflow="overflow" vert="horz" wrap="square" lIns="91440" tIns="45720" rIns="91440" bIns="45720" numCol="1" spcCol="0" rtlCol="0" fromWordArt="0" anchor="ctr" anchorCtr="0" forceAA="0" compatLnSpc="1">
+            <a:prstTxWarp prst="textNoShape">
+              <a:avLst/>
+            </a:prstTxWarp>
+            <a:noAutofit/>
+          </a:bodyPr>
+          <a:lstStyle/>
+          <a:p>
+            <a:pPr algn="ctr"/>
+            <a:r>
+              <a:rPr lang="en-US" altLang="zh-CN" sz="1400">
+                <a:solidFill>
+                  <a:schemeClr val="tx1"/>
+                </a:solidFill>
+              </a:rPr>
+              <a:t>Bill gates</a:t>
+            </a:r>
+            <a:endParaRPr lang="zh-CN" altLang="en-US" sz="1400" dirty="0">
+              <a:solidFill>
+                <a:schemeClr val="tx1"/>
+              </a:solidFill>
+            </a:endParaRPr>
+          </a:p>
+        </p:txBody>
+      </p:sp>
+      <p:sp>
+        <p:nvSpPr>
+          <p:cNvPr id="6" name="圆角矩形 5"/>
+          <p:cNvSpPr/>
+          <p:nvPr/>
+        </p:nvSpPr>
+        <p:spPr>
+          <a:xfrm>
+            <a:off x="2021606" y="3123041"/>
+            <a:ext cx="1597919" cy="536249"/>
+          </a:xfrm>
+          <a:prstGeom prst="roundRect">
+            <a:avLst/>
+          </a:prstGeom>
+          <a:solidFill>
+            <a:schemeClr val="bg1"/>
+          </a:solidFill>
+          <a:ln>
+            <a:noFill/>
+          </a:ln>
+        </p:spPr>
+        <p:style>
+          <a:lnRef idx="0">
+            <a:schemeClr val="accent1"/>
+          </a:lnRef>
+          <a:fillRef idx="3">
+            <a:schemeClr val="accent1"/>
+          </a:fillRef>
+          <a:effectRef idx="3">
+            <a:schemeClr val="accent1"/>
+          </a:effectRef>
+          <a:fontRef idx="minor">
+            <a:schemeClr val="lt1"/>
+          </a:fontRef>
+        </p:style>
+        <p:txBody>
+          <a:bodyPr rot="0" spcFirstLastPara="0" vertOverflow="overflow" horzOverflow="overflow" vert="horz" wrap="square" lIns="91440" tIns="45720" rIns="91440" bIns="45720" numCol="1" spcCol="0" rtlCol="0" fromWordArt="0" anchor="ctr" anchorCtr="0" forceAA="0" compatLnSpc="1">
+            <a:prstTxWarp prst="textNoShape">
+              <a:avLst/>
+            </a:prstTxWarp>
+            <a:noAutofit/>
+          </a:bodyPr>
+          <a:lstStyle/>
+          <a:p>
+            <a:pPr algn="ctr"/>
+            <a:r>
+              <a:rPr lang="en-US" altLang="zh-CN" sz="1600" dirty="0">
+                <a:solidFill>
+                  <a:schemeClr val="tx1"/>
+                </a:solidFill>
+              </a:rPr>
+              <a:t>Business Leader</a:t>
+            </a:r>
+          </a:p>
+        </p:txBody>
+      </p:sp>
+      <p:sp>
+        <p:nvSpPr>
+          <p:cNvPr id="7" name="圆角矩形 6"/>
+          <p:cNvSpPr/>
+          <p:nvPr/>
+        </p:nvSpPr>
+        <p:spPr>
+          <a:xfrm>
+            <a:off x="4157027" y="3123041"/>
+            <a:ext cx="1474712" cy="535346"/>
+          </a:xfrm>
+          <a:prstGeom prst="roundRect">
+            <a:avLst/>
+          </a:prstGeom>
+          <a:solidFill>
+            <a:schemeClr val="bg1"/>
+          </a:solidFill>
+          <a:ln>
+            <a:noFill/>
+          </a:ln>
+        </p:spPr>
+        <p:style>
+          <a:lnRef idx="0">
+            <a:schemeClr val="accent1"/>
+          </a:lnRef>
+          <a:fillRef idx="3">
+            <a:schemeClr val="accent1"/>
+          </a:fillRef>
+          <a:effectRef idx="3">
+            <a:schemeClr val="accent1"/>
+          </a:effectRef>
+          <a:fontRef idx="minor">
+            <a:schemeClr val="lt1"/>
+          </a:fontRef>
+        </p:style>
+        <p:txBody>
+          <a:bodyPr rot="0" spcFirstLastPara="0" vertOverflow="overflow" horzOverflow="overflow" vert="horz" wrap="square" lIns="91440" tIns="45720" rIns="91440" bIns="45720" numCol="1" spcCol="0" rtlCol="0" fromWordArt="0" anchor="ctr" anchorCtr="0" forceAA="0" compatLnSpc="1">
+            <a:prstTxWarp prst="textNoShape">
+              <a:avLst/>
+            </a:prstTxWarp>
+            <a:noAutofit/>
+          </a:bodyPr>
+          <a:lstStyle/>
+          <a:p>
+            <a:pPr algn="ctr"/>
+            <a:r>
+              <a:rPr lang="en-US" altLang="zh-CN" sz="1400" dirty="0">
+                <a:solidFill>
+                  <a:schemeClr val="tx1"/>
+                </a:solidFill>
+              </a:rPr>
+              <a:t>Successful </a:t>
+            </a:r>
+          </a:p>
+          <a:p>
+            <a:pPr algn="ctr"/>
+            <a:r>
+              <a:rPr lang="en-US" altLang="zh-CN" sz="1400" dirty="0">
+                <a:solidFill>
+                  <a:schemeClr val="tx1"/>
+                </a:solidFill>
+              </a:rPr>
+              <a:t>Business Leader</a:t>
+            </a:r>
+          </a:p>
+        </p:txBody>
+      </p:sp>
+      <p:sp>
+        <p:nvSpPr>
+          <p:cNvPr id="9" name="圆角矩形 8"/>
+          <p:cNvSpPr/>
+          <p:nvPr/>
+        </p:nvSpPr>
+        <p:spPr>
+          <a:xfrm>
+            <a:off x="1850835" y="1930191"/>
+            <a:ext cx="5883006" cy="1885080"/>
+          </a:xfrm>
+          <a:prstGeom prst="roundRect">
+            <a:avLst>
+              <a:gd name="adj" fmla="val 10238"/>
+            </a:avLst>
+          </a:prstGeom>
+          <a:noFill/>
+          <a:ln w="28575">
+            <a:solidFill>
+              <a:srgbClr val="FF0000"/>
+            </a:solidFill>
+            <a:prstDash val="sysDash"/>
+          </a:ln>
+        </p:spPr>
+        <p:style>
+          <a:lnRef idx="2">
+            <a:schemeClr val="accent1">
+              <a:shade val="50000"/>
+            </a:schemeClr>
+          </a:lnRef>
+          <a:fillRef idx="1">
+            <a:schemeClr val="accent1"/>
+          </a:fillRef>
+          <a:effectRef idx="0">
+            <a:schemeClr val="accent1"/>
+          </a:effectRef>
+          <a:fontRef idx="minor">
+            <a:schemeClr val="lt1"/>
+          </a:fontRef>
+        </p:style>
+        <p:txBody>
+          <a:bodyPr rot="0" spcFirstLastPara="0" vertOverflow="overflow" horzOverflow="overflow" vert="horz" wrap="square" lIns="91440" tIns="45720" rIns="91440" bIns="45720" numCol="1" spcCol="0" rtlCol="0" fromWordArt="0" anchor="ctr" anchorCtr="0" forceAA="0" compatLnSpc="1">
+            <a:prstTxWarp prst="textNoShape">
+              <a:avLst/>
+            </a:prstTxWarp>
+            <a:noAutofit/>
+          </a:bodyPr>
+          <a:lstStyle/>
+          <a:p>
+            <a:pPr algn="ctr"/>
+            <a:endParaRPr lang="zh-CN" altLang="en-US" sz="2400" dirty="0" smtClean="0">
+              <a:solidFill>
+                <a:sysClr val="windowText" lastClr="000000"/>
+              </a:solidFill>
+            </a:endParaRPr>
+          </a:p>
+        </p:txBody>
+      </p:sp>
+      <p:sp>
+        <p:nvSpPr>
+          <p:cNvPr id="10" name="文本框 9"/>
+          <p:cNvSpPr txBox="1"/>
+          <p:nvPr/>
+        </p:nvSpPr>
+        <p:spPr>
+          <a:xfrm>
+            <a:off x="6279848" y="2008329"/>
+            <a:ext cx="1453993" cy="338554"/>
+          </a:xfrm>
+          <a:prstGeom prst="rect">
+            <a:avLst/>
+          </a:prstGeom>
+          <a:noFill/>
+        </p:spPr>
+        <p:txBody>
+          <a:bodyPr wrap="square" rtlCol="0">
+            <a:spAutoFit/>
+          </a:bodyPr>
+          <a:lstStyle/>
+          <a:p>
+            <a:r>
+              <a:rPr lang="en-US" altLang="zh-CN" sz="1600" dirty="0" smtClean="0">
+                <a:solidFill>
+                  <a:srgbClr val="FF0000"/>
+                </a:solidFill>
+              </a:rPr>
+              <a:t>Head: leader</a:t>
+            </a:r>
+            <a:endParaRPr lang="zh-CN" altLang="en-US" sz="1600" dirty="0">
+              <a:solidFill>
+                <a:srgbClr val="FF0000"/>
+              </a:solidFill>
+            </a:endParaRPr>
+          </a:p>
+        </p:txBody>
+      </p:sp>
+      <p:cxnSp>
+        <p:nvCxnSpPr>
+          <p:cNvPr id="12" name="直接箭头连接符 11"/>
+          <p:cNvCxnSpPr>
+            <a:stCxn id="5" idx="0"/>
+            <a:endCxn id="7" idx="2"/>
+          </p:cNvCxnSpPr>
+          <p:nvPr/>
+        </p:nvCxnSpPr>
+        <p:spPr>
+          <a:xfrm flipV="1">
+            <a:off x="4164010" y="3658387"/>
+            <a:ext cx="730373" cy="2331701"/>
+          </a:xfrm>
+          <a:prstGeom prst="straightConnector1">
+            <a:avLst/>
+          </a:prstGeom>
+          <a:ln w="19050">
+            <a:solidFill>
+              <a:schemeClr val="bg1">
+                <a:lumMod val="65000"/>
+              </a:schemeClr>
+            </a:solidFill>
+            <a:tailEnd type="triangle"/>
+          </a:ln>
+        </p:spPr>
+        <p:style>
+          <a:lnRef idx="1">
+            <a:schemeClr val="accent1"/>
+          </a:lnRef>
+          <a:fillRef idx="0">
+            <a:schemeClr val="accent1"/>
+          </a:fillRef>
+          <a:effectRef idx="0">
+            <a:schemeClr val="accent1"/>
+          </a:effectRef>
+          <a:fontRef idx="minor">
+            <a:schemeClr val="tx1"/>
+          </a:fontRef>
+        </p:style>
+      </p:cxnSp>
+      <p:cxnSp>
+        <p:nvCxnSpPr>
+          <p:cNvPr id="13" name="直接箭头连接符 12"/>
+          <p:cNvCxnSpPr>
+            <a:stCxn id="5" idx="0"/>
+            <a:endCxn id="6" idx="2"/>
+          </p:cNvCxnSpPr>
+          <p:nvPr/>
+        </p:nvCxnSpPr>
+        <p:spPr>
+          <a:xfrm flipH="1" flipV="1">
+            <a:off x="2820566" y="3659290"/>
+            <a:ext cx="1343444" cy="2330798"/>
+          </a:xfrm>
+          <a:prstGeom prst="straightConnector1">
+            <a:avLst/>
+          </a:prstGeom>
+          <a:ln w="19050">
+            <a:solidFill>
+              <a:schemeClr val="bg1">
+                <a:lumMod val="65000"/>
+              </a:schemeClr>
+            </a:solidFill>
+            <a:tailEnd type="triangle"/>
+          </a:ln>
+        </p:spPr>
+        <p:style>
+          <a:lnRef idx="1">
+            <a:schemeClr val="accent1"/>
+          </a:lnRef>
+          <a:fillRef idx="0">
+            <a:schemeClr val="accent1"/>
+          </a:fillRef>
+          <a:effectRef idx="0">
+            <a:schemeClr val="accent1"/>
+          </a:effectRef>
+          <a:fontRef idx="minor">
+            <a:schemeClr val="tx1"/>
+          </a:fontRef>
+        </p:style>
+      </p:cxnSp>
+      <p:cxnSp>
+        <p:nvCxnSpPr>
+          <p:cNvPr id="19" name="直接箭头连接符 18"/>
+          <p:cNvCxnSpPr>
+            <a:stCxn id="5" idx="0"/>
+            <a:endCxn id="4" idx="2"/>
+          </p:cNvCxnSpPr>
+          <p:nvPr/>
+        </p:nvCxnSpPr>
+        <p:spPr>
+          <a:xfrm flipH="1" flipV="1">
+            <a:off x="3967696" y="2657040"/>
+            <a:ext cx="196314" cy="3333048"/>
+          </a:xfrm>
+          <a:prstGeom prst="straightConnector1">
+            <a:avLst/>
+          </a:prstGeom>
+          <a:ln w="19050">
+            <a:solidFill>
+              <a:schemeClr val="bg1">
+                <a:lumMod val="65000"/>
+              </a:schemeClr>
+            </a:solidFill>
+            <a:tailEnd type="triangle"/>
+          </a:ln>
+        </p:spPr>
+        <p:style>
+          <a:lnRef idx="1">
+            <a:schemeClr val="accent1"/>
+          </a:lnRef>
+          <a:fillRef idx="0">
+            <a:schemeClr val="accent1"/>
+          </a:fillRef>
+          <a:effectRef idx="0">
+            <a:schemeClr val="accent1"/>
+          </a:effectRef>
+          <a:fontRef idx="minor">
+            <a:schemeClr val="tx1"/>
+          </a:fontRef>
+        </p:style>
+      </p:cxnSp>
+      <p:sp>
+        <p:nvSpPr>
+          <p:cNvPr id="22" name="文本框 21"/>
+          <p:cNvSpPr txBox="1"/>
+          <p:nvPr/>
+        </p:nvSpPr>
+        <p:spPr>
+          <a:xfrm>
+            <a:off x="4817005" y="3815271"/>
+            <a:ext cx="506507" cy="369332"/>
+          </a:xfrm>
+          <a:prstGeom prst="rect">
+            <a:avLst/>
+          </a:prstGeom>
+          <a:noFill/>
+        </p:spPr>
+        <p:txBody>
+          <a:bodyPr wrap="square" rtlCol="0">
+            <a:spAutoFit/>
+          </a:bodyPr>
+          <a:lstStyle/>
+          <a:p>
+            <a:r>
+              <a:rPr lang="en-US" altLang="zh-CN" dirty="0" smtClean="0"/>
+              <a:t>1</a:t>
+            </a:r>
+            <a:endParaRPr lang="zh-CN" altLang="en-US" dirty="0"/>
+          </a:p>
+        </p:txBody>
+      </p:sp>
+      <p:sp>
+        <p:nvSpPr>
+          <p:cNvPr id="23" name="文本框 22"/>
+          <p:cNvSpPr txBox="1"/>
+          <p:nvPr/>
+        </p:nvSpPr>
+        <p:spPr>
+          <a:xfrm>
+            <a:off x="2940448" y="3876252"/>
+            <a:ext cx="506507" cy="369332"/>
+          </a:xfrm>
+          <a:prstGeom prst="rect">
+            <a:avLst/>
+          </a:prstGeom>
+          <a:noFill/>
+        </p:spPr>
+        <p:txBody>
+          <a:bodyPr wrap="square" rtlCol="0">
+            <a:spAutoFit/>
+          </a:bodyPr>
+          <a:lstStyle/>
+          <a:p>
+            <a:r>
+              <a:rPr lang="en-US" altLang="zh-CN" dirty="0" smtClean="0"/>
+              <a:t>17</a:t>
+            </a:r>
+            <a:endParaRPr lang="zh-CN" altLang="en-US" dirty="0"/>
+          </a:p>
+        </p:txBody>
+      </p:sp>
+      <p:sp>
+        <p:nvSpPr>
+          <p:cNvPr id="25" name="文本框 24"/>
+          <p:cNvSpPr txBox="1"/>
+          <p:nvPr/>
+        </p:nvSpPr>
+        <p:spPr>
+          <a:xfrm>
+            <a:off x="3802105" y="2787436"/>
+            <a:ext cx="403919" cy="369332"/>
+          </a:xfrm>
+          <a:prstGeom prst="rect">
+            <a:avLst/>
+          </a:prstGeom>
+          <a:noFill/>
+        </p:spPr>
+        <p:txBody>
+          <a:bodyPr wrap="square" rtlCol="0">
+            <a:spAutoFit/>
+          </a:bodyPr>
+          <a:lstStyle/>
+          <a:p>
+            <a:r>
+              <a:rPr lang="en-US" altLang="zh-CN" dirty="0" smtClean="0"/>
+              <a:t>9</a:t>
+            </a:r>
+            <a:endParaRPr lang="zh-CN" altLang="en-US" dirty="0"/>
+          </a:p>
+        </p:txBody>
+      </p:sp>
+      <p:sp>
+        <p:nvSpPr>
+          <p:cNvPr id="27" name="圆角矩形 26"/>
+          <p:cNvSpPr/>
+          <p:nvPr/>
+        </p:nvSpPr>
+        <p:spPr>
+          <a:xfrm>
+            <a:off x="5990861" y="3137152"/>
+            <a:ext cx="1628099" cy="507124"/>
+          </a:xfrm>
+          <a:prstGeom prst="roundRect">
+            <a:avLst/>
+          </a:prstGeom>
+          <a:solidFill>
+            <a:schemeClr val="bg1"/>
+          </a:solidFill>
+          <a:ln>
+            <a:noFill/>
+          </a:ln>
+        </p:spPr>
+        <p:style>
+          <a:lnRef idx="0">
+            <a:schemeClr val="accent1"/>
+          </a:lnRef>
+          <a:fillRef idx="3">
+            <a:schemeClr val="accent1"/>
+          </a:fillRef>
+          <a:effectRef idx="3">
+            <a:schemeClr val="accent1"/>
+          </a:effectRef>
+          <a:fontRef idx="minor">
+            <a:schemeClr val="lt1"/>
+          </a:fontRef>
+        </p:style>
+        <p:txBody>
+          <a:bodyPr rot="0" spcFirstLastPara="0" vertOverflow="overflow" horzOverflow="overflow" vert="horz" wrap="square" lIns="91440" tIns="45720" rIns="91440" bIns="45720" numCol="1" spcCol="0" rtlCol="0" fromWordArt="0" anchor="ctr" anchorCtr="0" forceAA="0" compatLnSpc="1">
+            <a:prstTxWarp prst="textNoShape">
+              <a:avLst/>
+            </a:prstTxWarp>
+            <a:noAutofit/>
+          </a:bodyPr>
+          <a:lstStyle/>
+          <a:p>
+            <a:pPr algn="ctr"/>
+            <a:r>
+              <a:rPr lang="en-US" altLang="zh-CN" sz="1600" dirty="0">
+                <a:solidFill>
+                  <a:schemeClr val="tx1"/>
+                </a:solidFill>
+              </a:rPr>
+              <a:t>Industry Leader</a:t>
+            </a:r>
+          </a:p>
+        </p:txBody>
+      </p:sp>
+      <p:cxnSp>
+        <p:nvCxnSpPr>
+          <p:cNvPr id="28" name="直接箭头连接符 27"/>
+          <p:cNvCxnSpPr>
+            <a:stCxn id="5" idx="0"/>
+            <a:endCxn id="27" idx="2"/>
+          </p:cNvCxnSpPr>
+          <p:nvPr/>
+        </p:nvCxnSpPr>
+        <p:spPr>
+          <a:xfrm flipV="1">
+            <a:off x="4164010" y="3644276"/>
+            <a:ext cx="2640901" cy="2345812"/>
+          </a:xfrm>
+          <a:prstGeom prst="straightConnector1">
+            <a:avLst/>
+          </a:prstGeom>
+          <a:ln w="19050">
+            <a:solidFill>
+              <a:schemeClr val="bg1">
+                <a:lumMod val="65000"/>
+              </a:schemeClr>
+            </a:solidFill>
+            <a:tailEnd type="triangle"/>
+          </a:ln>
+        </p:spPr>
+        <p:style>
+          <a:lnRef idx="1">
+            <a:schemeClr val="accent1"/>
+          </a:lnRef>
+          <a:fillRef idx="0">
+            <a:schemeClr val="accent1"/>
+          </a:fillRef>
+          <a:effectRef idx="0">
+            <a:schemeClr val="accent1"/>
+          </a:effectRef>
+          <a:fontRef idx="minor">
+            <a:schemeClr val="tx1"/>
+          </a:fontRef>
+        </p:style>
+      </p:cxnSp>
+      <p:sp>
+        <p:nvSpPr>
+          <p:cNvPr id="31" name="文本框 30"/>
+          <p:cNvSpPr txBox="1"/>
+          <p:nvPr/>
+        </p:nvSpPr>
+        <p:spPr>
+          <a:xfrm>
+            <a:off x="5125232" y="4854008"/>
+            <a:ext cx="506507" cy="369332"/>
+          </a:xfrm>
+          <a:prstGeom prst="rect">
+            <a:avLst/>
+          </a:prstGeom>
+          <a:noFill/>
+        </p:spPr>
+        <p:txBody>
+          <a:bodyPr wrap="square" rtlCol="0">
+            <a:spAutoFit/>
+          </a:bodyPr>
+          <a:lstStyle/>
+          <a:p>
+            <a:r>
+              <a:rPr lang="en-US" altLang="zh-CN" dirty="0" smtClean="0"/>
+              <a:t>5</a:t>
+            </a:r>
+          </a:p>
+        </p:txBody>
+      </p:sp>
+      <p:sp>
+        <p:nvSpPr>
+          <p:cNvPr id="36" name="圆角矩形 35"/>
+          <p:cNvSpPr/>
+          <p:nvPr/>
+        </p:nvSpPr>
+        <p:spPr>
+          <a:xfrm>
+            <a:off x="6271510" y="4781834"/>
+            <a:ext cx="1066800" cy="500107"/>
+          </a:xfrm>
+          <a:prstGeom prst="roundRect">
+            <a:avLst/>
+          </a:prstGeom>
+          <a:solidFill>
+            <a:schemeClr val="bg1"/>
+          </a:solidFill>
+          <a:ln>
+            <a:noFill/>
+          </a:ln>
+        </p:spPr>
+        <p:style>
+          <a:lnRef idx="0">
+            <a:schemeClr val="accent1"/>
+          </a:lnRef>
+          <a:fillRef idx="3">
+            <a:schemeClr val="accent1"/>
+          </a:fillRef>
+          <a:effectRef idx="3">
+            <a:schemeClr val="accent1"/>
+          </a:effectRef>
+          <a:fontRef idx="minor">
+            <a:schemeClr val="lt1"/>
+          </a:fontRef>
+        </p:style>
+        <p:txBody>
+          <a:bodyPr rot="0" spcFirstLastPara="0" vertOverflow="overflow" horzOverflow="overflow" vert="horz" wrap="square" lIns="91440" tIns="45720" rIns="91440" bIns="45720" numCol="1" spcCol="0" rtlCol="0" fromWordArt="0" anchor="ctr" anchorCtr="0" forceAA="0" compatLnSpc="1">
+            <a:prstTxWarp prst="textNoShape">
+              <a:avLst/>
+            </a:prstTxWarp>
+            <a:noAutofit/>
+          </a:bodyPr>
+          <a:lstStyle/>
+          <a:p>
+            <a:pPr algn="ctr"/>
+            <a:r>
+              <a:rPr lang="en-US" altLang="zh-CN" sz="1600" dirty="0">
+                <a:solidFill>
+                  <a:schemeClr val="tx1"/>
+                </a:solidFill>
+              </a:rPr>
+              <a:t>founder</a:t>
+            </a:r>
+            <a:endParaRPr lang="zh-CN" altLang="en-US" sz="1600" dirty="0">
+              <a:solidFill>
+                <a:schemeClr val="tx1"/>
+              </a:solidFill>
+            </a:endParaRPr>
+          </a:p>
+        </p:txBody>
+      </p:sp>
+      <p:cxnSp>
+        <p:nvCxnSpPr>
+          <p:cNvPr id="43" name="直接箭头连接符 42"/>
+          <p:cNvCxnSpPr>
+            <a:stCxn id="36" idx="0"/>
+            <a:endCxn id="27" idx="2"/>
+          </p:cNvCxnSpPr>
+          <p:nvPr/>
+        </p:nvCxnSpPr>
+        <p:spPr>
+          <a:xfrm flipV="1">
+            <a:off x="6804910" y="3644276"/>
+            <a:ext cx="1" cy="1137558"/>
+          </a:xfrm>
+          <a:prstGeom prst="straightConnector1">
+            <a:avLst/>
+          </a:prstGeom>
+          <a:ln w="19050">
+            <a:solidFill>
+              <a:schemeClr val="accent1"/>
+            </a:solidFill>
+            <a:prstDash val="lgDashDotDot"/>
+            <a:tailEnd type="triangle"/>
+          </a:ln>
+        </p:spPr>
+        <p:style>
+          <a:lnRef idx="1">
+            <a:schemeClr val="accent1"/>
+          </a:lnRef>
+          <a:fillRef idx="0">
+            <a:schemeClr val="accent1"/>
+          </a:fillRef>
+          <a:effectRef idx="0">
+            <a:schemeClr val="accent1"/>
+          </a:effectRef>
+          <a:fontRef idx="minor">
+            <a:schemeClr val="tx1"/>
+          </a:fontRef>
+        </p:style>
+      </p:cxnSp>
+      <p:cxnSp>
+        <p:nvCxnSpPr>
+          <p:cNvPr id="47" name="直接箭头连接符 46"/>
+          <p:cNvCxnSpPr>
+            <a:stCxn id="5" idx="3"/>
+            <a:endCxn id="36" idx="2"/>
+          </p:cNvCxnSpPr>
+          <p:nvPr/>
+        </p:nvCxnSpPr>
+        <p:spPr>
+          <a:xfrm flipV="1">
+            <a:off x="5090135" y="5281941"/>
+            <a:ext cx="1714775" cy="961564"/>
+          </a:xfrm>
+          <a:prstGeom prst="straightConnector1">
+            <a:avLst/>
+          </a:prstGeom>
+          <a:ln w="19050">
+            <a:solidFill>
+              <a:schemeClr val="accent1"/>
+            </a:solidFill>
+            <a:prstDash val="lgDashDotDot"/>
+            <a:tailEnd type="triangle"/>
+          </a:ln>
+        </p:spPr>
+        <p:style>
+          <a:lnRef idx="1">
+            <a:schemeClr val="accent1"/>
+          </a:lnRef>
+          <a:fillRef idx="0">
+            <a:schemeClr val="accent1"/>
+          </a:fillRef>
+          <a:effectRef idx="0">
+            <a:schemeClr val="accent1"/>
+          </a:effectRef>
+          <a:fontRef idx="minor">
+            <a:schemeClr val="tx1"/>
+          </a:fontRef>
+        </p:style>
+      </p:cxnSp>
+      <p:sp>
+        <p:nvSpPr>
+          <p:cNvPr id="50" name="圆角矩形 49"/>
+          <p:cNvSpPr/>
+          <p:nvPr/>
+        </p:nvSpPr>
+        <p:spPr>
+          <a:xfrm>
+            <a:off x="2020847" y="4781834"/>
+            <a:ext cx="1564341" cy="490632"/>
+          </a:xfrm>
+          <a:prstGeom prst="roundRect">
+            <a:avLst/>
+          </a:prstGeom>
+          <a:solidFill>
+            <a:schemeClr val="bg1"/>
+          </a:solidFill>
+          <a:ln>
+            <a:noFill/>
+          </a:ln>
+        </p:spPr>
+        <p:style>
+          <a:lnRef idx="0">
+            <a:schemeClr val="accent1"/>
+          </a:lnRef>
+          <a:fillRef idx="3">
+            <a:schemeClr val="accent1"/>
+          </a:fillRef>
+          <a:effectRef idx="3">
+            <a:schemeClr val="accent1"/>
+          </a:effectRef>
+          <a:fontRef idx="minor">
+            <a:schemeClr val="lt1"/>
+          </a:fontRef>
+        </p:style>
+        <p:txBody>
+          <a:bodyPr rot="0" spcFirstLastPara="0" vertOverflow="overflow" horzOverflow="overflow" vert="horz" wrap="square" lIns="91440" tIns="45720" rIns="91440" bIns="45720" numCol="1" spcCol="0" rtlCol="0" fromWordArt="0" anchor="ctr" anchorCtr="0" forceAA="0" compatLnSpc="1">
+            <a:prstTxWarp prst="textNoShape">
+              <a:avLst/>
+            </a:prstTxWarp>
+            <a:noAutofit/>
+          </a:bodyPr>
+          <a:lstStyle/>
+          <a:p>
+            <a:pPr algn="ctr"/>
+            <a:r>
+              <a:rPr lang="en-US" altLang="zh-CN" sz="1600" dirty="0">
+                <a:solidFill>
+                  <a:schemeClr val="tx1"/>
+                </a:solidFill>
+              </a:rPr>
+              <a:t>Successful entrepreneur</a:t>
+            </a:r>
+            <a:endParaRPr lang="zh-CN" altLang="en-US" sz="1600" dirty="0">
+              <a:solidFill>
+                <a:schemeClr val="tx1"/>
+              </a:solidFill>
+            </a:endParaRPr>
+          </a:p>
+        </p:txBody>
+      </p:sp>
+      <p:cxnSp>
+        <p:nvCxnSpPr>
+          <p:cNvPr id="54" name="直接箭头连接符 53"/>
+          <p:cNvCxnSpPr>
+            <a:stCxn id="5" idx="1"/>
+            <a:endCxn id="50" idx="2"/>
+          </p:cNvCxnSpPr>
+          <p:nvPr/>
+        </p:nvCxnSpPr>
+        <p:spPr>
+          <a:xfrm flipH="1" flipV="1">
+            <a:off x="2803018" y="5272466"/>
+            <a:ext cx="434867" cy="971039"/>
+          </a:xfrm>
+          <a:prstGeom prst="straightConnector1">
+            <a:avLst/>
+          </a:prstGeom>
+          <a:ln w="19050">
+            <a:solidFill>
+              <a:schemeClr val="accent1"/>
+            </a:solidFill>
+            <a:prstDash val="lgDashDotDot"/>
+            <a:tailEnd type="triangle"/>
+          </a:ln>
+        </p:spPr>
+        <p:style>
+          <a:lnRef idx="1">
+            <a:schemeClr val="accent1"/>
+          </a:lnRef>
+          <a:fillRef idx="0">
+            <a:schemeClr val="accent1"/>
+          </a:fillRef>
+          <a:effectRef idx="0">
+            <a:schemeClr val="accent1"/>
+          </a:effectRef>
+          <a:fontRef idx="minor">
+            <a:schemeClr val="tx1"/>
+          </a:fontRef>
+        </p:style>
+      </p:cxnSp>
+      <p:cxnSp>
+        <p:nvCxnSpPr>
+          <p:cNvPr id="61" name="直接箭头连接符 60"/>
+          <p:cNvCxnSpPr>
+            <a:stCxn id="50" idx="0"/>
+            <a:endCxn id="6" idx="2"/>
+          </p:cNvCxnSpPr>
+          <p:nvPr/>
+        </p:nvCxnSpPr>
+        <p:spPr>
+          <a:xfrm flipV="1">
+            <a:off x="2803018" y="3659290"/>
+            <a:ext cx="17548" cy="1122544"/>
+          </a:xfrm>
+          <a:prstGeom prst="straightConnector1">
+            <a:avLst/>
+          </a:prstGeom>
+          <a:ln w="19050">
+            <a:solidFill>
+              <a:schemeClr val="accent1"/>
+            </a:solidFill>
+            <a:prstDash val="lgDashDotDot"/>
+            <a:tailEnd type="triangle"/>
+          </a:ln>
+        </p:spPr>
+        <p:style>
+          <a:lnRef idx="1">
+            <a:schemeClr val="accent1"/>
+          </a:lnRef>
+          <a:fillRef idx="0">
+            <a:schemeClr val="accent1"/>
+          </a:fillRef>
+          <a:effectRef idx="0">
+            <a:schemeClr val="accent1"/>
+          </a:effectRef>
+          <a:fontRef idx="minor">
+            <a:schemeClr val="tx1"/>
+          </a:fontRef>
+        </p:style>
+      </p:cxnSp>
+      <p:sp>
+        <p:nvSpPr>
+          <p:cNvPr id="62" name="文本框 61"/>
+          <p:cNvSpPr txBox="1"/>
+          <p:nvPr/>
+        </p:nvSpPr>
+        <p:spPr>
+          <a:xfrm>
+            <a:off x="2518879" y="3903471"/>
+            <a:ext cx="301686" cy="369332"/>
+          </a:xfrm>
+          <a:prstGeom prst="rect">
+            <a:avLst/>
+          </a:prstGeom>
+          <a:noFill/>
+        </p:spPr>
+        <p:txBody>
+          <a:bodyPr wrap="none" rtlCol="0">
+            <a:spAutoFit/>
+          </a:bodyPr>
+          <a:lstStyle/>
+          <a:p>
+            <a:r>
+              <a:rPr lang="en-US" altLang="zh-CN" dirty="0" smtClean="0"/>
+              <a:t>1</a:t>
+            </a:r>
+            <a:endParaRPr lang="zh-CN" altLang="en-US" dirty="0"/>
+          </a:p>
+        </p:txBody>
+      </p:sp>
+      <p:sp>
+        <p:nvSpPr>
+          <p:cNvPr id="63" name="文本框 62"/>
+          <p:cNvSpPr txBox="1"/>
+          <p:nvPr/>
+        </p:nvSpPr>
+        <p:spPr>
+          <a:xfrm>
+            <a:off x="2915961" y="5281941"/>
+            <a:ext cx="403919" cy="369332"/>
+          </a:xfrm>
+          <a:prstGeom prst="rect">
+            <a:avLst/>
+          </a:prstGeom>
+          <a:noFill/>
+        </p:spPr>
+        <p:txBody>
+          <a:bodyPr wrap="square" rtlCol="0">
+            <a:spAutoFit/>
+          </a:bodyPr>
+          <a:lstStyle/>
+          <a:p>
+            <a:r>
+              <a:rPr lang="en-US" altLang="zh-CN" dirty="0" smtClean="0"/>
+              <a:t>9</a:t>
+            </a:r>
+            <a:endParaRPr lang="zh-CN" altLang="en-US" dirty="0"/>
+          </a:p>
+        </p:txBody>
+      </p:sp>
+      <p:sp>
+        <p:nvSpPr>
+          <p:cNvPr id="64" name="文本框 63"/>
+          <p:cNvSpPr txBox="1"/>
+          <p:nvPr/>
+        </p:nvSpPr>
+        <p:spPr>
+          <a:xfrm>
+            <a:off x="6628543" y="5295707"/>
+            <a:ext cx="506507" cy="369332"/>
+          </a:xfrm>
+          <a:prstGeom prst="rect">
+            <a:avLst/>
+          </a:prstGeom>
+          <a:noFill/>
+        </p:spPr>
+        <p:txBody>
+          <a:bodyPr wrap="square" rtlCol="0">
+            <a:spAutoFit/>
+          </a:bodyPr>
+          <a:lstStyle/>
+          <a:p>
+            <a:r>
+              <a:rPr lang="en-US" altLang="zh-CN" dirty="0" smtClean="0"/>
+              <a:t>1</a:t>
+            </a:r>
+            <a:endParaRPr lang="zh-CN" altLang="en-US" dirty="0"/>
+          </a:p>
+        </p:txBody>
+      </p:sp>
+      <p:sp>
+        <p:nvSpPr>
+          <p:cNvPr id="65" name="文本框 64"/>
+          <p:cNvSpPr txBox="1"/>
+          <p:nvPr/>
+        </p:nvSpPr>
+        <p:spPr>
+          <a:xfrm>
+            <a:off x="6831803" y="3846890"/>
+            <a:ext cx="506507" cy="369332"/>
+          </a:xfrm>
+          <a:prstGeom prst="rect">
+            <a:avLst/>
+          </a:prstGeom>
+          <a:noFill/>
+        </p:spPr>
+        <p:txBody>
+          <a:bodyPr wrap="square" rtlCol="0">
+            <a:spAutoFit/>
+          </a:bodyPr>
+          <a:lstStyle/>
+          <a:p>
+            <a:r>
+              <a:rPr lang="en-US" altLang="zh-CN" dirty="0" smtClean="0"/>
+              <a:t>1</a:t>
+            </a:r>
+            <a:endParaRPr lang="zh-CN" altLang="en-US" dirty="0"/>
+          </a:p>
+        </p:txBody>
+      </p:sp>
+      <p:sp>
+        <p:nvSpPr>
+          <p:cNvPr id="141" name="文本框 140"/>
+          <p:cNvSpPr txBox="1"/>
+          <p:nvPr/>
+        </p:nvSpPr>
+        <p:spPr>
+          <a:xfrm>
+            <a:off x="6766372" y="4364921"/>
+            <a:ext cx="737356" cy="338554"/>
+          </a:xfrm>
+          <a:prstGeom prst="rect">
+            <a:avLst/>
+          </a:prstGeom>
+          <a:noFill/>
+        </p:spPr>
+        <p:txBody>
+          <a:bodyPr wrap="square" rtlCol="0">
+            <a:spAutoFit/>
+          </a:bodyPr>
+          <a:lstStyle>
+            <a:defPPr>
+              <a:defRPr lang="zh-CN"/>
+            </a:defPPr>
+            <a:lvl1pPr>
+              <a:defRPr sz="1600">
+                <a:solidFill>
+                  <a:schemeClr val="accent1"/>
+                </a:solidFill>
+              </a:defRPr>
+            </a:lvl1pPr>
+          </a:lstStyle>
+          <a:p>
+            <a:r>
+              <a:rPr lang="en-US" altLang="zh-CN" dirty="0"/>
+              <a:t>is a</a:t>
+            </a:r>
+            <a:endParaRPr lang="zh-CN" altLang="en-US" dirty="0"/>
+          </a:p>
+        </p:txBody>
+      </p:sp>
+      <p:sp>
+        <p:nvSpPr>
+          <p:cNvPr id="142" name="文本框 141"/>
+          <p:cNvSpPr txBox="1"/>
+          <p:nvPr/>
+        </p:nvSpPr>
+        <p:spPr>
+          <a:xfrm>
+            <a:off x="2418149" y="4380508"/>
+            <a:ext cx="737356" cy="338554"/>
+          </a:xfrm>
+          <a:prstGeom prst="rect">
+            <a:avLst/>
+          </a:prstGeom>
+          <a:noFill/>
+        </p:spPr>
+        <p:txBody>
+          <a:bodyPr wrap="square" rtlCol="0">
+            <a:spAutoFit/>
+          </a:bodyPr>
+          <a:lstStyle/>
+          <a:p>
+            <a:r>
+              <a:rPr lang="en-US" altLang="zh-CN" sz="1600" dirty="0" smtClean="0">
+                <a:solidFill>
+                  <a:schemeClr val="accent1"/>
+                </a:solidFill>
+              </a:rPr>
+              <a:t>is a</a:t>
+            </a:r>
+            <a:endParaRPr lang="zh-CN" altLang="en-US" sz="1600" dirty="0">
+              <a:solidFill>
+                <a:schemeClr val="accent1"/>
+              </a:solidFill>
+            </a:endParaRPr>
+          </a:p>
+        </p:txBody>
+      </p:sp>
+    </p:spTree>
+    <p:extLst>
+      <p:ext uri="{BB962C8B-B14F-4D97-AF65-F5344CB8AC3E}">
+        <p14:creationId xmlns:p14="http://schemas.microsoft.com/office/powerpoint/2010/main" val="3959642065"/>
+      </p:ext>
+    </p:extLst>
+  </p:cSld>
+  <p:clrMapOvr>
+    <a:masterClrMapping/>
+  </p:clrMapOvr>
+  <p:timing>
+    <p:tnLst>
+      <p:par>
+        <p:cTn id="1" dur="indefinite" restart="never" nodeType="tmRoot"/>
+      </p:par>
+    </p:tnLst>
+  </p:timing>
+</p:sld>
+</file>
+
+<file path=ppt/slides/slide12.xml><?xml version="1.0" encoding="utf-8"?>
 <p:sld xmlns:a="http://schemas.openxmlformats.org/drawingml/2006/main" xmlns:r="http://schemas.openxmlformats.org/officeDocument/2006/relationships" xmlns:p="http://schemas.openxmlformats.org/presentationml/2006/main" show="0">
   <p:cSld>
     <p:spTree>
@@ -7080,7 +8246,7 @@
 </p:sld>
 </file>
 
-<file path=ppt/slides/slide12.xml><?xml version="1.0" encoding="utf-8"?>
+<file path=ppt/slides/slide13.xml><?xml version="1.0" encoding="utf-8"?>
 <p:sld xmlns:a="http://schemas.openxmlformats.org/drawingml/2006/main" xmlns:r="http://schemas.openxmlformats.org/officeDocument/2006/relationships" xmlns:p="http://schemas.openxmlformats.org/presentationml/2006/main">
   <p:cSld>
     <p:spTree>
@@ -8090,13 +9256,15 @@
           <a:solidFill>
             <a:schemeClr val="bg1"/>
           </a:solidFill>
-          <a:ln>
+          <a:ln w="19050">
             <a:solidFill>
               <a:schemeClr val="bg1">
                 <a:lumMod val="50000"/>
               </a:schemeClr>
             </a:solidFill>
+            <a:prstDash val="lgDash"/>
           </a:ln>
+          <a:effectLst/>
         </p:spPr>
         <p:style>
           <a:lnRef idx="0">
@@ -8147,10 +9315,10 @@
           <a:solidFill>
             <a:schemeClr val="bg1"/>
           </a:solidFill>
-          <a:ln>
+          <a:ln w="12700">
             <a:solidFill>
               <a:schemeClr val="bg1">
-                <a:lumMod val="50000"/>
+                <a:lumMod val="65000"/>
               </a:schemeClr>
             </a:solidFill>
           </a:ln>
@@ -8207,10 +9375,10 @@
           <a:solidFill>
             <a:schemeClr val="bg1"/>
           </a:solidFill>
-          <a:ln>
+          <a:ln w="12700">
             <a:solidFill>
               <a:schemeClr val="bg1">
-                <a:lumMod val="50000"/>
+                <a:lumMod val="65000"/>
               </a:schemeClr>
             </a:solidFill>
           </a:ln>
@@ -8297,10 +9465,10 @@
           <a:solidFill>
             <a:schemeClr val="bg1"/>
           </a:solidFill>
-          <a:ln>
+          <a:ln w="12700">
             <a:solidFill>
               <a:schemeClr val="bg1">
-                <a:lumMod val="50000"/>
+                <a:lumMod val="65000"/>
               </a:schemeClr>
             </a:solidFill>
           </a:ln>
@@ -8388,11 +9556,7 @@
             <a:schemeClr val="bg1"/>
           </a:solidFill>
           <a:ln>
-            <a:solidFill>
-              <a:schemeClr val="bg1">
-                <a:lumMod val="50000"/>
-              </a:schemeClr>
-            </a:solidFill>
+            <a:noFill/>
           </a:ln>
         </p:spPr>
         <p:style>
@@ -8453,11 +9617,7 @@
             <a:schemeClr val="bg1"/>
           </a:solidFill>
           <a:ln>
-            <a:solidFill>
-              <a:schemeClr val="bg1">
-                <a:lumMod val="50000"/>
-              </a:schemeClr>
-            </a:solidFill>
+            <a:noFill/>
           </a:ln>
         </p:spPr>
         <p:style>
@@ -8518,11 +9678,7 @@
             <a:schemeClr val="bg1"/>
           </a:solidFill>
           <a:ln>
-            <a:solidFill>
-              <a:schemeClr val="bg1">
-                <a:lumMod val="50000"/>
-              </a:schemeClr>
-            </a:solidFill>
+            <a:noFill/>
           </a:ln>
         </p:spPr>
         <p:style>
@@ -8730,11 +9886,7 @@
                 <a:schemeClr val="bg1"/>
               </a:solidFill>
               <a:ln>
-                <a:solidFill>
-                  <a:schemeClr val="bg1">
-                    <a:lumMod val="50000"/>
-                  </a:schemeClr>
-                </a:solidFill>
+                <a:noFill/>
               </a:ln>
             </p:spPr>
             <p:style>
@@ -8887,17 +10039,13 @@
                 <a:avLst/>
               </a:prstGeom>
               <a:blipFill rotWithShape="0">
-                <a:blip r:embed="rId3"/>
+                <a:blip r:embed="rId2"/>
                 <a:stretch>
                   <a:fillRect/>
                 </a:stretch>
               </a:blipFill>
               <a:ln>
-                <a:solidFill>
-                  <a:schemeClr val="bg1">
-                    <a:lumMod val="50000"/>
-                  </a:schemeClr>
-                </a:solidFill>
+                <a:noFill/>
               </a:ln>
             </p:spPr>
             <p:txBody>
@@ -8935,11 +10083,7 @@
                 <a:schemeClr val="bg1"/>
               </a:solidFill>
               <a:ln>
-                <a:solidFill>
-                  <a:schemeClr val="bg1">
-                    <a:lumMod val="50000"/>
-                  </a:schemeClr>
-                </a:solidFill>
+                <a:noFill/>
               </a:ln>
             </p:spPr>
             <p:style>
@@ -9441,17 +10585,13 @@
                 <a:avLst/>
               </a:prstGeom>
               <a:blipFill rotWithShape="0">
-                <a:blip r:embed="rId4"/>
+                <a:blip r:embed="rId3"/>
                 <a:stretch>
                   <a:fillRect/>
                 </a:stretch>
               </a:blipFill>
               <a:ln>
-                <a:solidFill>
-                  <a:schemeClr val="bg1">
-                    <a:lumMod val="50000"/>
-                  </a:schemeClr>
-                </a:solidFill>
+                <a:noFill/>
               </a:ln>
             </p:spPr>
             <p:txBody>
@@ -9482,6 +10622,7 @@
             <a:chOff x="6598572" y="1168400"/>
             <a:chExt cx="1034128" cy="347487"/>
           </a:xfrm>
+          <a:effectLst/>
         </p:grpSpPr>
         <p:sp>
           <p:nvSpPr>
@@ -9501,11 +10642,7 @@
               <a:schemeClr val="bg1"/>
             </a:solidFill>
             <a:ln>
-              <a:solidFill>
-                <a:schemeClr val="bg1">
-                  <a:lumMod val="50000"/>
-                </a:schemeClr>
-              </a:solidFill>
+              <a:noFill/>
             </a:ln>
           </p:spPr>
           <p:style>
@@ -9558,11 +10695,7 @@
               <a:schemeClr val="bg1"/>
             </a:solidFill>
             <a:ln>
-              <a:solidFill>
-                <a:schemeClr val="bg1">
-                  <a:lumMod val="50000"/>
-                </a:schemeClr>
-              </a:solidFill>
+              <a:noFill/>
             </a:ln>
           </p:spPr>
           <p:style>

</xml_diff>

<commit_message>
space modified by shaw
</commit_message>
<xml_diff>
--- a/resources/mypaper.pptx
+++ b/resources/mypaper.pptx
@@ -255,7 +255,7 @@
           <a:p>
             <a:fld id="{CF4993DB-1284-461A-A2D5-97453C944B44}" type="datetimeFigureOut">
               <a:rPr lang="zh-CN" altLang="en-US" smtClean="0"/>
-              <a:t>2015/9/15</a:t>
+              <a:t>2015/9/16</a:t>
             </a:fld>
             <a:endParaRPr lang="zh-CN" altLang="en-US"/>
           </a:p>
@@ -425,7 +425,7 @@
           <a:p>
             <a:fld id="{CF4993DB-1284-461A-A2D5-97453C944B44}" type="datetimeFigureOut">
               <a:rPr lang="zh-CN" altLang="en-US" smtClean="0"/>
-              <a:t>2015/9/15</a:t>
+              <a:t>2015/9/16</a:t>
             </a:fld>
             <a:endParaRPr lang="zh-CN" altLang="en-US"/>
           </a:p>
@@ -605,7 +605,7 @@
           <a:p>
             <a:fld id="{CF4993DB-1284-461A-A2D5-97453C944B44}" type="datetimeFigureOut">
               <a:rPr lang="zh-CN" altLang="en-US" smtClean="0"/>
-              <a:t>2015/9/15</a:t>
+              <a:t>2015/9/16</a:t>
             </a:fld>
             <a:endParaRPr lang="zh-CN" altLang="en-US"/>
           </a:p>
@@ -775,7 +775,7 @@
           <a:p>
             <a:fld id="{CF4993DB-1284-461A-A2D5-97453C944B44}" type="datetimeFigureOut">
               <a:rPr lang="zh-CN" altLang="en-US" smtClean="0"/>
-              <a:t>2015/9/15</a:t>
+              <a:t>2015/9/16</a:t>
             </a:fld>
             <a:endParaRPr lang="zh-CN" altLang="en-US"/>
           </a:p>
@@ -1021,7 +1021,7 @@
           <a:p>
             <a:fld id="{CF4993DB-1284-461A-A2D5-97453C944B44}" type="datetimeFigureOut">
               <a:rPr lang="zh-CN" altLang="en-US" smtClean="0"/>
-              <a:t>2015/9/15</a:t>
+              <a:t>2015/9/16</a:t>
             </a:fld>
             <a:endParaRPr lang="zh-CN" altLang="en-US"/>
           </a:p>
@@ -1253,7 +1253,7 @@
           <a:p>
             <a:fld id="{CF4993DB-1284-461A-A2D5-97453C944B44}" type="datetimeFigureOut">
               <a:rPr lang="zh-CN" altLang="en-US" smtClean="0"/>
-              <a:t>2015/9/15</a:t>
+              <a:t>2015/9/16</a:t>
             </a:fld>
             <a:endParaRPr lang="zh-CN" altLang="en-US"/>
           </a:p>
@@ -1620,7 +1620,7 @@
           <a:p>
             <a:fld id="{CF4993DB-1284-461A-A2D5-97453C944B44}" type="datetimeFigureOut">
               <a:rPr lang="zh-CN" altLang="en-US" smtClean="0"/>
-              <a:t>2015/9/15</a:t>
+              <a:t>2015/9/16</a:t>
             </a:fld>
             <a:endParaRPr lang="zh-CN" altLang="en-US"/>
           </a:p>
@@ -1738,7 +1738,7 @@
           <a:p>
             <a:fld id="{CF4993DB-1284-461A-A2D5-97453C944B44}" type="datetimeFigureOut">
               <a:rPr lang="zh-CN" altLang="en-US" smtClean="0"/>
-              <a:t>2015/9/15</a:t>
+              <a:t>2015/9/16</a:t>
             </a:fld>
             <a:endParaRPr lang="zh-CN" altLang="en-US"/>
           </a:p>
@@ -1833,7 +1833,7 @@
           <a:p>
             <a:fld id="{CF4993DB-1284-461A-A2D5-97453C944B44}" type="datetimeFigureOut">
               <a:rPr lang="zh-CN" altLang="en-US" smtClean="0"/>
-              <a:t>2015/9/15</a:t>
+              <a:t>2015/9/16</a:t>
             </a:fld>
             <a:endParaRPr lang="zh-CN" altLang="en-US"/>
           </a:p>
@@ -2110,7 +2110,7 @@
           <a:p>
             <a:fld id="{CF4993DB-1284-461A-A2D5-97453C944B44}" type="datetimeFigureOut">
               <a:rPr lang="zh-CN" altLang="en-US" smtClean="0"/>
-              <a:t>2015/9/15</a:t>
+              <a:t>2015/9/16</a:t>
             </a:fld>
             <a:endParaRPr lang="zh-CN" altLang="en-US"/>
           </a:p>
@@ -2363,7 +2363,7 @@
           <a:p>
             <a:fld id="{CF4993DB-1284-461A-A2D5-97453C944B44}" type="datetimeFigureOut">
               <a:rPr lang="zh-CN" altLang="en-US" smtClean="0"/>
-              <a:t>2015/9/15</a:t>
+              <a:t>2015/9/16</a:t>
             </a:fld>
             <a:endParaRPr lang="zh-CN" altLang="en-US"/>
           </a:p>
@@ -2576,7 +2576,7 @@
           <a:p>
             <a:fld id="{CF4993DB-1284-461A-A2D5-97453C944B44}" type="datetimeFigureOut">
               <a:rPr lang="zh-CN" altLang="en-US" smtClean="0"/>
-              <a:t>2015/9/15</a:t>
+              <a:t>2015/9/16</a:t>
             </a:fld>
             <a:endParaRPr lang="zh-CN" altLang="en-US"/>
           </a:p>
@@ -5147,8 +5147,8 @@
         </p:nvSpPr>
         <p:spPr>
           <a:xfrm>
-            <a:off x="3237885" y="2191717"/>
-            <a:ext cx="1459621" cy="465323"/>
+            <a:off x="3237885" y="3237627"/>
+            <a:ext cx="1459621" cy="358085"/>
           </a:xfrm>
           <a:prstGeom prst="roundRect">
             <a:avLst/>
@@ -5203,8 +5203,8 @@
         </p:nvSpPr>
         <p:spPr>
           <a:xfrm>
-            <a:off x="3237885" y="5990088"/>
-            <a:ext cx="1852250" cy="506833"/>
+            <a:off x="3619525" y="5501696"/>
+            <a:ext cx="1754901" cy="354067"/>
           </a:xfrm>
           <a:prstGeom prst="roundRect">
             <a:avLst/>
@@ -5241,14 +5241,14 @@
           <a:p>
             <a:pPr algn="ctr"/>
             <a:r>
-              <a:rPr lang="en-US" altLang="zh-CN" sz="1400">
+              <a:rPr lang="en-US" altLang="zh-CN" sz="1600" dirty="0">
                 <a:solidFill>
                   <a:schemeClr val="tx1"/>
                 </a:solidFill>
               </a:rPr>
               <a:t>Bill gates</a:t>
             </a:r>
-            <a:endParaRPr lang="zh-CN" altLang="en-US" sz="1400" dirty="0">
+            <a:endParaRPr lang="zh-CN" altLang="en-US" sz="1600" dirty="0">
               <a:solidFill>
                 <a:schemeClr val="tx1"/>
               </a:solidFill>
@@ -5264,8 +5264,8 @@
         </p:nvSpPr>
         <p:spPr>
           <a:xfrm>
-            <a:off x="2021606" y="3123041"/>
-            <a:ext cx="1597919" cy="536249"/>
+            <a:off x="2021606" y="3843468"/>
+            <a:ext cx="1597919" cy="455090"/>
           </a:xfrm>
           <a:prstGeom prst="roundRect">
             <a:avLst/>
@@ -5320,8 +5320,8 @@
         </p:nvSpPr>
         <p:spPr>
           <a:xfrm>
-            <a:off x="4157027" y="3123041"/>
-            <a:ext cx="1474712" cy="535346"/>
+            <a:off x="4157027" y="3843331"/>
+            <a:ext cx="1474712" cy="454324"/>
           </a:xfrm>
           <a:prstGeom prst="roundRect">
             <a:avLst/>
@@ -5387,8 +5387,8 @@
         </p:nvSpPr>
         <p:spPr>
           <a:xfrm>
-            <a:off x="1850835" y="1930191"/>
-            <a:ext cx="5883006" cy="1885080"/>
+            <a:off x="1850835" y="3147801"/>
+            <a:ext cx="5883006" cy="1306737"/>
           </a:xfrm>
           <a:prstGeom prst="roundRect">
             <a:avLst>
@@ -5445,8 +5445,8 @@
         </p:nvSpPr>
         <p:spPr>
           <a:xfrm>
-            <a:off x="6279848" y="2008329"/>
-            <a:ext cx="1453993" cy="338554"/>
+            <a:off x="6409320" y="3303049"/>
+            <a:ext cx="1453993" cy="307777"/>
           </a:xfrm>
           <a:prstGeom prst="rect">
             <a:avLst/>
@@ -5460,14 +5460,14 @@
           <a:lstStyle/>
           <a:p>
             <a:r>
-              <a:rPr lang="en-US" altLang="zh-CN" sz="1600" dirty="0" smtClean="0">
+              <a:rPr lang="en-US" altLang="zh-CN" sz="1400" dirty="0" smtClean="0">
                 <a:solidFill>
                   <a:srgbClr val="FF0000"/>
                 </a:solidFill>
               </a:rPr>
               <a:t>Head: leader</a:t>
             </a:r>
-            <a:endParaRPr lang="zh-CN" altLang="en-US" sz="1600" dirty="0">
+            <a:endParaRPr lang="zh-CN" altLang="en-US" sz="1400" dirty="0">
               <a:solidFill>
                 <a:srgbClr val="FF0000"/>
               </a:solidFill>
@@ -5486,8 +5486,8 @@
         </p:nvCxnSpPr>
         <p:spPr>
           <a:xfrm flipV="1">
-            <a:off x="4164010" y="3658387"/>
-            <a:ext cx="730373" cy="2331701"/>
+            <a:off x="4496976" y="4297655"/>
+            <a:ext cx="397407" cy="1204041"/>
           </a:xfrm>
           <a:prstGeom prst="straightConnector1">
             <a:avLst/>
@@ -5527,8 +5527,8 @@
         </p:nvCxnSpPr>
         <p:spPr>
           <a:xfrm flipH="1" flipV="1">
-            <a:off x="2820566" y="3659290"/>
-            <a:ext cx="1343444" cy="2330798"/>
+            <a:off x="2820566" y="4298558"/>
+            <a:ext cx="1676410" cy="1203138"/>
           </a:xfrm>
           <a:prstGeom prst="straightConnector1">
             <a:avLst/>
@@ -5568,8 +5568,8 @@
         </p:nvCxnSpPr>
         <p:spPr>
           <a:xfrm flipH="1" flipV="1">
-            <a:off x="3967696" y="2657040"/>
-            <a:ext cx="196314" cy="3333048"/>
+            <a:off x="3967696" y="3595712"/>
+            <a:ext cx="529280" cy="1905984"/>
           </a:xfrm>
           <a:prstGeom prst="straightConnector1">
             <a:avLst/>
@@ -5606,8 +5606,8 @@
         </p:nvSpPr>
         <p:spPr>
           <a:xfrm>
-            <a:off x="4817005" y="3815271"/>
-            <a:ext cx="506507" cy="369332"/>
+            <a:off x="4817005" y="4454539"/>
+            <a:ext cx="506507" cy="307777"/>
           </a:xfrm>
           <a:prstGeom prst="rect">
             <a:avLst/>
@@ -5621,10 +5621,10 @@
           <a:lstStyle/>
           <a:p>
             <a:r>
-              <a:rPr lang="en-US" altLang="zh-CN" dirty="0" smtClean="0"/>
+              <a:rPr lang="en-US" altLang="zh-CN" sz="1400" dirty="0" smtClean="0"/>
               <a:t>1</a:t>
             </a:r>
-            <a:endParaRPr lang="zh-CN" altLang="en-US" dirty="0"/>
+            <a:endParaRPr lang="zh-CN" altLang="en-US" sz="1400" dirty="0"/>
           </a:p>
         </p:txBody>
       </p:sp>
@@ -5636,8 +5636,8 @@
         </p:nvSpPr>
         <p:spPr>
           <a:xfrm>
-            <a:off x="2940448" y="3876252"/>
-            <a:ext cx="506507" cy="369332"/>
+            <a:off x="2940448" y="4515520"/>
+            <a:ext cx="506507" cy="307777"/>
           </a:xfrm>
           <a:prstGeom prst="rect">
             <a:avLst/>
@@ -5651,10 +5651,10 @@
           <a:lstStyle/>
           <a:p>
             <a:r>
-              <a:rPr lang="en-US" altLang="zh-CN" dirty="0" smtClean="0"/>
+              <a:rPr lang="en-US" altLang="zh-CN" sz="1400" dirty="0" smtClean="0"/>
               <a:t>17</a:t>
             </a:r>
-            <a:endParaRPr lang="zh-CN" altLang="en-US" dirty="0"/>
+            <a:endParaRPr lang="zh-CN" altLang="en-US" sz="1400" dirty="0"/>
           </a:p>
         </p:txBody>
       </p:sp>
@@ -5666,8 +5666,8 @@
         </p:nvSpPr>
         <p:spPr>
           <a:xfrm>
-            <a:off x="3802105" y="2787436"/>
-            <a:ext cx="403919" cy="369332"/>
+            <a:off x="3802105" y="3726108"/>
+            <a:ext cx="403919" cy="307777"/>
           </a:xfrm>
           <a:prstGeom prst="rect">
             <a:avLst/>
@@ -5681,10 +5681,10 @@
           <a:lstStyle/>
           <a:p>
             <a:r>
-              <a:rPr lang="en-US" altLang="zh-CN" dirty="0" smtClean="0"/>
+              <a:rPr lang="en-US" altLang="zh-CN" sz="1400" dirty="0" smtClean="0"/>
               <a:t>9</a:t>
             </a:r>
-            <a:endParaRPr lang="zh-CN" altLang="en-US" dirty="0"/>
+            <a:endParaRPr lang="zh-CN" altLang="en-US" sz="1400" dirty="0"/>
           </a:p>
         </p:txBody>
       </p:sp>
@@ -5696,8 +5696,8 @@
         </p:nvSpPr>
         <p:spPr>
           <a:xfrm>
-            <a:off x="5990861" y="3137152"/>
-            <a:ext cx="1628099" cy="507124"/>
+            <a:off x="5990861" y="3853170"/>
+            <a:ext cx="1628099" cy="430373"/>
           </a:xfrm>
           <a:prstGeom prst="roundRect">
             <a:avLst/>
@@ -5755,8 +5755,8 @@
         </p:nvCxnSpPr>
         <p:spPr>
           <a:xfrm flipV="1">
-            <a:off x="4164010" y="3644276"/>
-            <a:ext cx="2640901" cy="2345812"/>
+            <a:off x="4496976" y="4283543"/>
+            <a:ext cx="2307935" cy="1218153"/>
           </a:xfrm>
           <a:prstGeom prst="straightConnector1">
             <a:avLst/>
@@ -5793,8 +5793,8 @@
         </p:nvSpPr>
         <p:spPr>
           <a:xfrm>
-            <a:off x="5125232" y="4854008"/>
-            <a:ext cx="506507" cy="369332"/>
+            <a:off x="5125232" y="4943020"/>
+            <a:ext cx="506507" cy="307777"/>
           </a:xfrm>
           <a:prstGeom prst="rect">
             <a:avLst/>
@@ -5808,7 +5808,7 @@
           <a:lstStyle/>
           <a:p>
             <a:r>
-              <a:rPr lang="en-US" altLang="zh-CN" dirty="0" smtClean="0"/>
+              <a:rPr lang="en-US" altLang="zh-CN" sz="1400" dirty="0" smtClean="0"/>
               <a:t>5</a:t>
             </a:r>
           </a:p>
@@ -5822,8 +5822,8 @@
         </p:nvSpPr>
         <p:spPr>
           <a:xfrm>
-            <a:off x="6271510" y="4781834"/>
-            <a:ext cx="1066800" cy="500107"/>
+            <a:off x="6271510" y="4960525"/>
+            <a:ext cx="1066800" cy="361034"/>
           </a:xfrm>
           <a:prstGeom prst="roundRect">
             <a:avLst/>
@@ -5886,8 +5886,8 @@
         </p:nvCxnSpPr>
         <p:spPr>
           <a:xfrm flipV="1">
-            <a:off x="6804910" y="3644276"/>
-            <a:ext cx="1" cy="1137558"/>
+            <a:off x="6804910" y="4283543"/>
+            <a:ext cx="1" cy="676982"/>
           </a:xfrm>
           <a:prstGeom prst="straightConnector1">
             <a:avLst/>
@@ -5926,8 +5926,8 @@
         </p:nvCxnSpPr>
         <p:spPr>
           <a:xfrm flipV="1">
-            <a:off x="5090135" y="5281941"/>
-            <a:ext cx="1714775" cy="961564"/>
+            <a:off x="5374426" y="5321559"/>
+            <a:ext cx="1430484" cy="357171"/>
           </a:xfrm>
           <a:prstGeom prst="straightConnector1">
             <a:avLst/>
@@ -5963,8 +5963,8 @@
         </p:nvSpPr>
         <p:spPr>
           <a:xfrm>
-            <a:off x="2020847" y="4781834"/>
-            <a:ext cx="1564341" cy="490632"/>
+            <a:off x="2011503" y="4962276"/>
+            <a:ext cx="1564341" cy="359283"/>
           </a:xfrm>
           <a:prstGeom prst="roundRect">
             <a:avLst/>
@@ -6001,14 +6001,14 @@
           <a:p>
             <a:pPr algn="ctr"/>
             <a:r>
-              <a:rPr lang="en-US" altLang="zh-CN" sz="1600" dirty="0">
+              <a:rPr lang="en-US" altLang="zh-CN" sz="1400" dirty="0">
                 <a:solidFill>
                   <a:schemeClr val="tx1"/>
                 </a:solidFill>
               </a:rPr>
               <a:t>Successful entrepreneur</a:t>
             </a:r>
-            <a:endParaRPr lang="zh-CN" altLang="en-US" sz="1600" dirty="0">
+            <a:endParaRPr lang="zh-CN" altLang="en-US" sz="1400" dirty="0">
               <a:solidFill>
                 <a:schemeClr val="tx1"/>
               </a:solidFill>
@@ -6027,8 +6027,8 @@
         </p:nvCxnSpPr>
         <p:spPr>
           <a:xfrm flipH="1" flipV="1">
-            <a:off x="2803018" y="5272466"/>
-            <a:ext cx="434867" cy="971039"/>
+            <a:off x="2793674" y="5321559"/>
+            <a:ext cx="825851" cy="357171"/>
           </a:xfrm>
           <a:prstGeom prst="straightConnector1">
             <a:avLst/>
@@ -6067,8 +6067,8 @@
         </p:nvCxnSpPr>
         <p:spPr>
           <a:xfrm flipV="1">
-            <a:off x="2803018" y="3659290"/>
-            <a:ext cx="17548" cy="1122544"/>
+            <a:off x="2793674" y="4298558"/>
+            <a:ext cx="26892" cy="663718"/>
           </a:xfrm>
           <a:prstGeom prst="straightConnector1">
             <a:avLst/>
@@ -6104,8 +6104,8 @@
         </p:nvSpPr>
         <p:spPr>
           <a:xfrm>
-            <a:off x="2518879" y="3903471"/>
-            <a:ext cx="301686" cy="369332"/>
+            <a:off x="2518879" y="4542739"/>
+            <a:ext cx="276038" cy="307777"/>
           </a:xfrm>
           <a:prstGeom prst="rect">
             <a:avLst/>
@@ -6119,10 +6119,10 @@
           <a:lstStyle/>
           <a:p>
             <a:r>
-              <a:rPr lang="en-US" altLang="zh-CN" dirty="0" smtClean="0"/>
+              <a:rPr lang="en-US" altLang="zh-CN" sz="1400" dirty="0" smtClean="0"/>
               <a:t>1</a:t>
             </a:r>
-            <a:endParaRPr lang="zh-CN" altLang="en-US" dirty="0"/>
+            <a:endParaRPr lang="zh-CN" altLang="en-US" sz="1400" dirty="0"/>
           </a:p>
         </p:txBody>
       </p:sp>
@@ -6134,8 +6134,8 @@
         </p:nvSpPr>
         <p:spPr>
           <a:xfrm>
-            <a:off x="2915961" y="5281941"/>
-            <a:ext cx="403919" cy="369332"/>
+            <a:off x="2915961" y="5370953"/>
+            <a:ext cx="403919" cy="307777"/>
           </a:xfrm>
           <a:prstGeom prst="rect">
             <a:avLst/>
@@ -6149,10 +6149,10 @@
           <a:lstStyle/>
           <a:p>
             <a:r>
-              <a:rPr lang="en-US" altLang="zh-CN" dirty="0" smtClean="0"/>
+              <a:rPr lang="en-US" altLang="zh-CN" sz="1400" dirty="0" smtClean="0"/>
               <a:t>9</a:t>
             </a:r>
-            <a:endParaRPr lang="zh-CN" altLang="en-US" dirty="0"/>
+            <a:endParaRPr lang="zh-CN" altLang="en-US" sz="1400" dirty="0"/>
           </a:p>
         </p:txBody>
       </p:sp>
@@ -6164,8 +6164,8 @@
         </p:nvSpPr>
         <p:spPr>
           <a:xfrm>
-            <a:off x="6628543" y="5295707"/>
-            <a:ext cx="506507" cy="369332"/>
+            <a:off x="6628543" y="5384719"/>
+            <a:ext cx="506507" cy="307777"/>
           </a:xfrm>
           <a:prstGeom prst="rect">
             <a:avLst/>
@@ -6179,10 +6179,10 @@
           <a:lstStyle/>
           <a:p>
             <a:r>
-              <a:rPr lang="en-US" altLang="zh-CN" dirty="0" smtClean="0"/>
+              <a:rPr lang="en-US" altLang="zh-CN" sz="1400" dirty="0" smtClean="0"/>
               <a:t>1</a:t>
             </a:r>
-            <a:endParaRPr lang="zh-CN" altLang="en-US" dirty="0"/>
+            <a:endParaRPr lang="zh-CN" altLang="en-US" sz="1400" dirty="0"/>
           </a:p>
         </p:txBody>
       </p:sp>
@@ -6194,8 +6194,8 @@
         </p:nvSpPr>
         <p:spPr>
           <a:xfrm>
-            <a:off x="6831803" y="3846890"/>
-            <a:ext cx="506507" cy="369332"/>
+            <a:off x="6831803" y="4486158"/>
+            <a:ext cx="506507" cy="307777"/>
           </a:xfrm>
           <a:prstGeom prst="rect">
             <a:avLst/>
@@ -6209,10 +6209,10 @@
           <a:lstStyle/>
           <a:p>
             <a:r>
-              <a:rPr lang="en-US" altLang="zh-CN" dirty="0" smtClean="0"/>
+              <a:rPr lang="en-US" altLang="zh-CN" sz="1400" dirty="0" smtClean="0"/>
               <a:t>1</a:t>
             </a:r>
-            <a:endParaRPr lang="zh-CN" altLang="en-US" dirty="0"/>
+            <a:endParaRPr lang="zh-CN" altLang="en-US" sz="1400" dirty="0"/>
           </a:p>
         </p:txBody>
       </p:sp>
@@ -6224,8 +6224,8 @@
         </p:nvSpPr>
         <p:spPr>
           <a:xfrm>
-            <a:off x="6766372" y="4364921"/>
-            <a:ext cx="737356" cy="338554"/>
+            <a:off x="6766372" y="4704785"/>
+            <a:ext cx="737356" cy="276999"/>
           </a:xfrm>
           <a:prstGeom prst="rect">
             <a:avLst/>
@@ -6250,10 +6250,10 @@
           </a:lstStyle>
           <a:p>
             <a:r>
-              <a:rPr lang="en-US" altLang="zh-CN" dirty="0"/>
+              <a:rPr lang="en-US" altLang="zh-CN" sz="1200" dirty="0"/>
               <a:t>is a</a:t>
             </a:r>
-            <a:endParaRPr lang="zh-CN" altLang="en-US" dirty="0"/>
+            <a:endParaRPr lang="zh-CN" altLang="en-US" sz="1200" dirty="0"/>
           </a:p>
         </p:txBody>
       </p:sp>
@@ -6265,8 +6265,8 @@
         </p:nvSpPr>
         <p:spPr>
           <a:xfrm>
-            <a:off x="2418149" y="4380508"/>
-            <a:ext cx="737356" cy="338554"/>
+            <a:off x="2418149" y="4720372"/>
+            <a:ext cx="737356" cy="276999"/>
           </a:xfrm>
           <a:prstGeom prst="rect">
             <a:avLst/>
@@ -6280,14 +6280,14 @@
           <a:lstStyle/>
           <a:p>
             <a:r>
-              <a:rPr lang="en-US" altLang="zh-CN" sz="1600" dirty="0" smtClean="0">
+              <a:rPr lang="en-US" altLang="zh-CN" sz="1200" dirty="0" smtClean="0">
                 <a:solidFill>
                   <a:schemeClr val="accent1"/>
                 </a:solidFill>
               </a:rPr>
               <a:t>is a</a:t>
             </a:r>
-            <a:endParaRPr lang="zh-CN" altLang="en-US" sz="1600" dirty="0">
+            <a:endParaRPr lang="zh-CN" altLang="en-US" sz="1200" dirty="0">
               <a:solidFill>
                 <a:schemeClr val="accent1"/>
               </a:solidFill>

</xml_diff>